<commit_message>
Atualização geral e organização dos arquivos
</commit_message>
<xml_diff>
--- a/Apresentação.pptx
+++ b/Apresentação.pptx
@@ -8,8 +8,9 @@
     <p:sldId id="256" r:id="rId2"/>
     <p:sldId id="257" r:id="rId3"/>
     <p:sldId id="259" r:id="rId4"/>
-    <p:sldId id="258" r:id="rId5"/>
-    <p:sldId id="260" r:id="rId6"/>
+    <p:sldId id="261" r:id="rId5"/>
+    <p:sldId id="258" r:id="rId6"/>
+    <p:sldId id="260" r:id="rId7"/>
   </p:sldIdLst>
   <p:sldSz cx="12192000" cy="6858000"/>
   <p:notesSz cx="6858000" cy="9144000"/>
@@ -131,9 +132,10 @@
 <file path=ppt/revisionInfo.xml><?xml version="1.0" encoding="utf-8"?>
 <p1510:revInfo xmlns:a="http://schemas.openxmlformats.org/drawingml/2006/main" xmlns:r="http://schemas.openxmlformats.org/officeDocument/2006/relationships" xmlns:p1510="http://schemas.microsoft.com/office/powerpoint/2015/10/main">
   <p1510:revLst>
+    <p1510:client id="{047C6E86-7C30-4241-B46F-B8C8E8ABB4A3}" v="386" dt="2020-02-04T11:44:14.081"/>
+    <p1510:client id="{31EBDF8C-74E0-4583-9A7C-601B868BE9ED}" v="465" dt="2020-02-04T23:32:33.938"/>
+    <p1510:client id="{846D8F95-3A8F-40E3-B2DB-F48DC6D0F035}" v="363" dt="2020-02-04T13:01:50.837"/>
     <p1510:client id="{BFB58E73-2B93-45D3-A615-CEF9626A4ED6}" v="15" dt="2020-02-04T13:16:05.067"/>
-    <p1510:client id="{047C6E86-7C30-4241-B46F-B8C8E8ABB4A3}" v="386" dt="2020-02-04T11:44:14.081"/>
-    <p1510:client id="{846D8F95-3A8F-40E3-B2DB-F48DC6D0F035}" v="363" dt="2020-02-04T13:01:50.837"/>
   </p1510:revLst>
 </p1510:revInfo>
 </file>
@@ -3163,55 +3165,50 @@
           <a:p>
             <a:pPr algn="l"/>
             <a:r>
-              <a:rPr lang="de-DE" dirty="0">
+              <a:rPr lang="de-DE" sz="2000" dirty="0">
+                <a:latin typeface="Rockwell"/>
                 <a:cs typeface="Calibri"/>
               </a:rPr>
               <a:t>Como </a:t>
             </a:r>
             <a:r>
-              <a:rPr lang="de-DE" dirty="0" err="1">
+              <a:rPr lang="de-DE" sz="2000" err="1">
+                <a:latin typeface="Rockwell"/>
                 <a:cs typeface="Calibri"/>
               </a:rPr>
               <a:t>eles</a:t>
             </a:r>
             <a:r>
-              <a:rPr lang="de-DE" dirty="0">
+              <a:rPr lang="de-DE" sz="2000" dirty="0">
+                <a:latin typeface="Rockwell"/>
                 <a:cs typeface="Calibri"/>
               </a:rPr>
               <a:t> </a:t>
             </a:r>
             <a:r>
-              <a:rPr lang="de-DE" dirty="0" err="1">
+              <a:rPr lang="de-DE" sz="2000" err="1">
+                <a:latin typeface="Rockwell"/>
                 <a:cs typeface="Calibri"/>
               </a:rPr>
               <a:t>facilitam</a:t>
             </a:r>
             <a:r>
-              <a:rPr lang="de-DE" dirty="0">
+              <a:rPr lang="de-DE" sz="2000">
+                <a:latin typeface="Rockwell"/>
                 <a:cs typeface="Calibri"/>
               </a:rPr>
-              <a:t> a </a:t>
-            </a:r>
-            <a:r>
-              <a:rPr lang="de-DE" dirty="0" err="1">
+              <a:t> a nossa </a:t>
+            </a:r>
+            <a:r>
+              <a:rPr lang="de-DE" sz="2000" err="1">
+                <a:latin typeface="Rockwell"/>
                 <a:cs typeface="Calibri"/>
               </a:rPr>
-              <a:t>nossa</a:t>
-            </a:r>
-            <a:r>
-              <a:rPr lang="de-DE" dirty="0">
-                <a:cs typeface="Calibri"/>
-              </a:rPr>
-              <a:t> </a:t>
-            </a:r>
-            <a:r>
-              <a:rPr lang="de-DE" dirty="0" err="1">
-                <a:cs typeface="Calibri"/>
-              </a:rPr>
               <a:t>vida</a:t>
             </a:r>
             <a:r>
-              <a:rPr lang="de-DE" dirty="0">
+              <a:rPr lang="de-DE" sz="2000" dirty="0">
+                <a:latin typeface="Rockwell"/>
                 <a:cs typeface="Calibri"/>
               </a:rPr>
               <a:t>?</a:t>
@@ -3472,6 +3469,7 @@
           <a:p>
             <a:r>
               <a:rPr lang="pt-BR" dirty="0">
+                <a:latin typeface="Rockwell"/>
                 <a:cs typeface="Calibri"/>
               </a:rPr>
               <a:t>O que são?</a:t>
@@ -3481,6 +3479,7 @@
             <a:pPr lvl="1"/>
             <a:r>
               <a:rPr lang="pt-BR" dirty="0">
+                <a:latin typeface="Calibri"/>
                 <a:cs typeface="Calibri"/>
               </a:rPr>
               <a:t>Eventos disparados mediante  uma ação no banco de dados</a:t>
@@ -3549,7 +3548,7 @@
         <p:spPr>
           <a:xfrm>
             <a:off x="896854" y="2270460"/>
-            <a:ext cx="10854489" cy="3600986"/>
+            <a:ext cx="10854489" cy="4647426"/>
           </a:xfrm>
           <a:prstGeom prst="rect">
             <a:avLst/>
@@ -3576,6 +3575,7 @@
             </a:pPr>
             <a:r>
               <a:rPr lang="pt-BR" sz="2800" dirty="0">
+                <a:latin typeface="Rockwell"/>
                 <a:cs typeface="Calibri"/>
               </a:rPr>
               <a:t>Onde são usados?</a:t>
@@ -3588,13 +3588,20 @@
             </a:pPr>
             <a:r>
               <a:rPr lang="pt-BR" sz="2400" dirty="0">
-                <a:latin typeface="Segoe UI"/>
+                <a:latin typeface="Rockwell"/>
                 <a:cs typeface="Segoe UI"/>
               </a:rPr>
-              <a:t>    Mecanismos de validação envolvendo múltiplas tabelas;</a:t>
-            </a:r>
-            <a:endParaRPr lang="pt-BR" sz="2400" dirty="0">
-              <a:latin typeface="Segoe UI"/>
+              <a:t>    </a:t>
+            </a:r>
+            <a:r>
+              <a:rPr lang="pt-BR" sz="2400" dirty="0">
+                <a:latin typeface="Calibri"/>
+                <a:cs typeface="Segoe UI"/>
+              </a:rPr>
+              <a:t>Mecanismos de validação envolvendo múltiplas tabelas;</a:t>
+            </a:r>
+            <a:endParaRPr lang="pt-BR" sz="2400">
+              <a:latin typeface="Calibri"/>
               <a:cs typeface="Calibri"/>
             </a:endParaRPr>
           </a:p>
@@ -3605,13 +3612,13 @@
             </a:pPr>
             <a:r>
               <a:rPr lang="pt-BR" sz="2400" dirty="0">
-                <a:latin typeface="Segoe UI"/>
+                <a:latin typeface="Calibri"/>
                 <a:cs typeface="Segoe UI"/>
               </a:rPr>
               <a:t>    Criação de conteúdo de uma coluna derivada de outras colunas da tabela;</a:t>
             </a:r>
-            <a:endParaRPr lang="pt-BR" sz="2400" dirty="0">
-              <a:latin typeface="Segoe UI"/>
+            <a:endParaRPr lang="pt-BR" sz="2400">
+              <a:latin typeface="Calibri"/>
               <a:cs typeface="Calibri"/>
             </a:endParaRPr>
           </a:p>
@@ -3622,21 +3629,18 @@
             </a:pPr>
             <a:r>
               <a:rPr lang="pt-BR" sz="2400" dirty="0">
-                <a:latin typeface="Segoe UI"/>
+                <a:latin typeface="Calibri"/>
                 <a:cs typeface="Segoe UI"/>
               </a:rPr>
-              <a:t>    Realizar análise e atualizações em outras tabelas com base em alterações e/ou inclusões da tabela atual</a:t>
-            </a:r>
-          </a:p>
-          <a:p>
-            <a:pPr lvl="1">
-              <a:buFont typeface="Arial"/>
-              <a:buChar char="•"/>
-            </a:pPr>
-            <a:endParaRPr lang="pt-BR" sz="2400" dirty="0">
-              <a:latin typeface="Segoe UI"/>
-              <a:cs typeface="Calibri"/>
-            </a:endParaRPr>
+              <a:t>    Realizar análise e atualizações em outras tabelas com base em alterações e/ou </a:t>
+            </a:r>
+            <a:r>
+              <a:rPr lang="pt-BR" sz="2400">
+                <a:latin typeface="Calibri"/>
+                <a:cs typeface="Segoe UI"/>
+              </a:rPr>
+              <a:t>inclusões da tabela atual</a:t>
+            </a:r>
           </a:p>
           <a:p>
             <a:pPr marL="342900" indent="-342900">
@@ -3644,10 +3648,11 @@
               <a:buChar char="•"/>
             </a:pPr>
             <a:r>
-              <a:rPr lang="pt-BR" sz="2800" dirty="0">
+              <a:rPr lang="pt-BR" sz="2800">
+                <a:latin typeface="Rockwell"/>
                 <a:cs typeface="Calibri"/>
               </a:rPr>
-              <a:t>Onde não podem ser usados?</a:t>
+              <a:t>Quais comandos não podem ser usados em um Trigger?</a:t>
             </a:r>
           </a:p>
           <a:p>
@@ -3656,15 +3661,13 @@
               <a:buChar char="•"/>
             </a:pPr>
             <a:r>
-              <a:rPr lang="pt-BR" sz="2800" i="1" dirty="0">
+              <a:rPr lang="pt-BR" sz="2400">
+                <a:latin typeface="Consolas"/>
                 <a:ea typeface="+mn-lt"/>
                 <a:cs typeface="+mn-lt"/>
               </a:rPr>
-              <a:t>ALTER, CREATE, DROP.</a:t>
-            </a:r>
-            <a:endParaRPr lang="pt-BR" sz="2800" i="1" dirty="0">
-              <a:cs typeface="Calibri"/>
-            </a:endParaRPr>
+              <a:t>ALTER DATABASE, ALTER TRIGGER, ALTER PROCEDURE, ALTER TABLE, ALTER VIEW | CREATE DATABASE, CREATE INDEX, CREATE PROCEDURE, CREATE SCHEMA, CREATE TABLE | DROP DATABASE, DROP TABLE, DROP PROCEDURE, DROP TRIGGER, DROP INDEX, GRANT | LOAD DATABASE, REVOKE, RESTORE DATABASE, TRUNCATE TABLE.</a:t>
+            </a:r>
           </a:p>
         </p:txBody>
       </p:sp>
@@ -3721,13 +3724,13 @@
           <a:p>
             <a:pPr algn="ctr"/>
             <a:r>
-              <a:rPr lang="pt-BR" dirty="0">
+              <a:rPr lang="pt-BR">
                 <a:latin typeface="Rockwell"/>
                 <a:cs typeface="Calibri Light"/>
               </a:rPr>
-              <a:t>Base do trigger:</a:t>
-            </a:r>
-            <a:endParaRPr lang="pt-BR" dirty="0">
+              <a:t>Base para criar um Trigger:</a:t>
+            </a:r>
+            <a:endParaRPr lang="pt-BR">
               <a:latin typeface="Rockwell"/>
             </a:endParaRPr>
           </a:p>
@@ -3930,6 +3933,144 @@
 </file>
 
 <file path=ppt/slides/slide4.xml><?xml version="1.0" encoding="utf-8"?>
+<p:sld xmlns:a="http://schemas.openxmlformats.org/drawingml/2006/main" xmlns:r="http://schemas.openxmlformats.org/officeDocument/2006/relationships" xmlns:p="http://schemas.openxmlformats.org/presentationml/2006/main">
+  <p:cSld>
+    <p:spTree>
+      <p:nvGrpSpPr>
+        <p:cNvPr id="1" name=""/>
+        <p:cNvGrpSpPr/>
+        <p:nvPr/>
+      </p:nvGrpSpPr>
+      <p:grpSpPr>
+        <a:xfrm>
+          <a:off x="0" y="0"/>
+          <a:ext cx="0" cy="0"/>
+          <a:chOff x="0" y="0"/>
+          <a:chExt cx="0" cy="0"/>
+        </a:xfrm>
+      </p:grpSpPr>
+      <p:sp>
+        <p:nvSpPr>
+          <p:cNvPr id="2" name="Título 1">
+            <a:extLst>
+              <a:ext uri="{FF2B5EF4-FFF2-40B4-BE49-F238E27FC236}">
+                <a16:creationId xmlns:a16="http://schemas.microsoft.com/office/drawing/2014/main" id="{0F391095-DCBD-4970-9C08-CEAB41EF7E13}"/>
+              </a:ext>
+            </a:extLst>
+          </p:cNvPr>
+          <p:cNvSpPr>
+            <a:spLocks noGrp="1"/>
+          </p:cNvSpPr>
+          <p:nvPr>
+            <p:ph type="title"/>
+          </p:nvPr>
+        </p:nvSpPr>
+        <p:spPr/>
+        <p:txBody>
+          <a:bodyPr/>
+          <a:lstStyle/>
+          <a:p>
+            <a:pPr algn="ctr"/>
+            <a:r>
+              <a:rPr lang="pt-BR" dirty="0">
+                <a:latin typeface="Rockwell"/>
+                <a:cs typeface="Calibri Light"/>
+              </a:rPr>
+              <a:t>Funcionalidade dos Triggers:</a:t>
+            </a:r>
+          </a:p>
+        </p:txBody>
+      </p:sp>
+      <p:sp>
+        <p:nvSpPr>
+          <p:cNvPr id="3" name="Espaço Reservado para Conteúdo 2">
+            <a:extLst>
+              <a:ext uri="{FF2B5EF4-FFF2-40B4-BE49-F238E27FC236}">
+                <a16:creationId xmlns:a16="http://schemas.microsoft.com/office/drawing/2014/main" id="{A5C62CEF-FC5A-4218-8186-36CDFFEF2265}"/>
+              </a:ext>
+            </a:extLst>
+          </p:cNvPr>
+          <p:cNvSpPr>
+            <a:spLocks noGrp="1"/>
+          </p:cNvSpPr>
+          <p:nvPr>
+            <p:ph idx="1"/>
+          </p:nvPr>
+        </p:nvSpPr>
+        <p:spPr/>
+        <p:txBody>
+          <a:bodyPr vert="horz" lIns="91440" tIns="45720" rIns="91440" bIns="45720" rtlCol="0" anchor="t">
+            <a:normAutofit/>
+          </a:bodyPr>
+          <a:lstStyle/>
+          <a:p>
+            <a:pPr algn="just">
+              <a:lnSpc>
+                <a:spcPct val="150000"/>
+              </a:lnSpc>
+              <a:spcBef>
+                <a:spcPts val="0"/>
+              </a:spcBef>
+            </a:pPr>
+            <a:r>
+              <a:rPr lang="pt-BR" dirty="0">
+                <a:latin typeface="Rockwell"/>
+                <a:cs typeface="Calibri"/>
+              </a:rPr>
+              <a:t>TRIGGER INSERT</a:t>
+            </a:r>
+            <a:endParaRPr lang="pt-BR"/>
+          </a:p>
+          <a:p>
+            <a:pPr algn="just">
+              <a:lnSpc>
+                <a:spcPct val="150000"/>
+              </a:lnSpc>
+              <a:spcBef>
+                <a:spcPts val="0"/>
+              </a:spcBef>
+            </a:pPr>
+            <a:r>
+              <a:rPr lang="pt-BR" dirty="0">
+                <a:latin typeface="Rockwell"/>
+                <a:cs typeface="Calibri"/>
+              </a:rPr>
+              <a:t>TRIGGER DELETE</a:t>
+            </a:r>
+          </a:p>
+          <a:p>
+            <a:pPr algn="just">
+              <a:lnSpc>
+                <a:spcPct val="150000"/>
+              </a:lnSpc>
+              <a:spcBef>
+                <a:spcPts val="0"/>
+              </a:spcBef>
+            </a:pPr>
+            <a:r>
+              <a:rPr lang="pt-BR" dirty="0">
+                <a:latin typeface="Rockwell"/>
+                <a:cs typeface="Calibri"/>
+              </a:rPr>
+              <a:t>TRIGGER UPDATE</a:t>
+            </a:r>
+          </a:p>
+        </p:txBody>
+      </p:sp>
+    </p:spTree>
+    <p:extLst>
+      <p:ext uri="{BB962C8B-B14F-4D97-AF65-F5344CB8AC3E}">
+        <p14:creationId xmlns:p14="http://schemas.microsoft.com/office/powerpoint/2010/main" val="4148838406"/>
+      </p:ext>
+    </p:extLst>
+  </p:cSld>
+  <p:clrMapOvr>
+    <a:masterClrMapping/>
+  </p:clrMapOvr>
+</p:sld>
+</file>
+
+<file path=ppt/slides/slide5.xml><?xml version="1.0" encoding="utf-8"?>
 <p:sld xmlns:a="http://schemas.openxmlformats.org/drawingml/2006/main" xmlns:r="http://schemas.openxmlformats.org/officeDocument/2006/relationships" xmlns:p="http://schemas.openxmlformats.org/presentationml/2006/main">
   <p:cSld>
     <p:bg>
@@ -4043,7 +4184,7 @@
 </p:sld>
 </file>
 
-<file path=ppt/slides/slide5.xml><?xml version="1.0" encoding="utf-8"?>
+<file path=ppt/slides/slide6.xml><?xml version="1.0" encoding="utf-8"?>
 <p:sld xmlns:a="http://schemas.openxmlformats.org/drawingml/2006/main" xmlns:r="http://schemas.openxmlformats.org/officeDocument/2006/relationships" xmlns:p="http://schemas.openxmlformats.org/presentationml/2006/main">
   <p:cSld>
     <p:spTree>
@@ -4119,7 +4260,7 @@
         </p:spPr>
         <p:txBody>
           <a:bodyPr vert="horz" lIns="91440" tIns="45720" rIns="91440" bIns="45720" rtlCol="0" anchor="t">
-            <a:normAutofit/>
+            <a:normAutofit lnSpcReduction="10000"/>
           </a:bodyPr>
           <a:lstStyle/>
           <a:p>
@@ -4128,34 +4269,34 @@
             </a:pPr>
             <a:r>
               <a:rPr lang="pt-BR" dirty="0">
+                <a:solidFill>
+                  <a:schemeClr val="accent1"/>
+                </a:solidFill>
+                <a:latin typeface="Consolas"/>
                 <a:ea typeface="+mn-lt"/>
                 <a:cs typeface="+mn-lt"/>
               </a:rPr>
-              <a:t>CREATE TRIGGER </a:t>
-            </a:r>
-            <a:r>
-              <a:rPr lang="pt-BR" dirty="0" err="1">
+              <a:t>CREATE TRIGGER</a:t>
+            </a:r>
+            <a:r>
+              <a:rPr lang="pt-BR" dirty="0">
+                <a:latin typeface="Consolas"/>
                 <a:ea typeface="+mn-lt"/>
                 <a:cs typeface="+mn-lt"/>
               </a:rPr>
-              <a:t>safety</a:t>
-            </a:r>
-            <a:endParaRPr lang="pt-BR"/>
-          </a:p>
-          <a:p>
-            <a:pPr marL="0" indent="0">
-              <a:buNone/>
-            </a:pPr>
-            <a:r>
-              <a:rPr lang="pt-BR" dirty="0">
+              <a:t> </a:t>
+            </a:r>
+            <a:r>
+              <a:rPr lang="pt-BR" err="1">
+                <a:latin typeface="Consolas"/>
                 <a:ea typeface="+mn-lt"/>
                 <a:cs typeface="+mn-lt"/>
               </a:rPr>
-              <a:t> ON DATABASE </a:t>
+              <a:t>safety</a:t>
             </a:r>
             <a:endParaRPr lang="pt-BR">
-              <a:ea typeface="+mn-lt"/>
-              <a:cs typeface="+mn-lt"/>
+              <a:latin typeface="Consolas"/>
+              <a:cs typeface="Calibri"/>
             </a:endParaRPr>
           </a:p>
           <a:p>
@@ -4163,11 +4304,15 @@
               <a:buNone/>
             </a:pPr>
             <a:r>
-              <a:rPr lang="pt-BR" dirty="0">
+              <a:rPr lang="pt-BR">
+                <a:solidFill>
+                  <a:schemeClr val="accent1"/>
+                </a:solidFill>
+                <a:latin typeface="Consolas"/>
                 <a:ea typeface="+mn-lt"/>
                 <a:cs typeface="+mn-lt"/>
               </a:rPr>
-              <a:t>FOR DROP_TABLE, ALTER_TABLE </a:t>
+              <a:t>ON DATABASE </a:t>
             </a:r>
           </a:p>
           <a:p>
@@ -4175,37 +4320,47 @@
               <a:buNone/>
             </a:pPr>
             <a:r>
-              <a:rPr lang="pt-BR" dirty="0">
+              <a:rPr lang="pt-BR">
+                <a:solidFill>
+                  <a:schemeClr val="accent1"/>
+                </a:solidFill>
+                <a:latin typeface="Consolas"/>
                 <a:ea typeface="+mn-lt"/>
                 <a:cs typeface="+mn-lt"/>
               </a:rPr>
-              <a:t>AS </a:t>
-            </a:r>
-          </a:p>
-          <a:p>
-            <a:pPr marL="0" indent="0">
-              <a:buNone/>
-            </a:pPr>
-            <a:r>
-              <a:rPr lang="pt-BR" dirty="0">
+              <a:t>FOR</a:t>
+            </a:r>
+            <a:r>
+              <a:rPr lang="pt-BR">
+                <a:latin typeface="Consolas"/>
                 <a:ea typeface="+mn-lt"/>
                 <a:cs typeface="+mn-lt"/>
               </a:rPr>
-              <a:t>      PRINT 'Você deve desativar o trigger "safety</a:t>
-            </a:r>
-            <a:r>
-              <a:rPr lang="pt-BR">
+              <a:t> DROP_TABLE, ALTER_TABLE AS </a:t>
+            </a:r>
+          </a:p>
+          <a:p>
+            <a:pPr marL="0" indent="0">
+              <a:buNone/>
+            </a:pPr>
+            <a:r>
+              <a:rPr lang="pt-BR" dirty="0">
+                <a:latin typeface="Consolas"/>
                 <a:ea typeface="+mn-lt"/>
                 <a:cs typeface="+mn-lt"/>
               </a:rPr>
-              <a:t>"para dropar ou alterar tabelas</a:t>
-            </a:r>
-            <a:r>
-              <a:rPr lang="pt-BR" dirty="0">
+              <a:t>      </a:t>
+            </a:r>
+            <a:r>
+              <a:rPr lang="pt-BR">
+                <a:solidFill>
+                  <a:schemeClr val="accent1"/>
+                </a:solidFill>
+                <a:latin typeface="Consolas"/>
                 <a:ea typeface="+mn-lt"/>
                 <a:cs typeface="+mn-lt"/>
               </a:rPr>
-              <a:t>!' </a:t>
+              <a:t>BEGIN</a:t>
             </a:r>
           </a:p>
           <a:p>
@@ -4214,12 +4369,101 @@
             </a:pPr>
             <a:r>
               <a:rPr lang="pt-BR" dirty="0">
+                <a:latin typeface="Consolas"/>
                 <a:ea typeface="+mn-lt"/>
                 <a:cs typeface="+mn-lt"/>
               </a:rPr>
-              <a:t>      ROLLBACK; </a:t>
+              <a:t>           </a:t>
+            </a:r>
+            <a:r>
+              <a:rPr lang="pt-BR">
+                <a:solidFill>
+                  <a:schemeClr val="accent1"/>
+                </a:solidFill>
+                <a:latin typeface="Consolas"/>
+                <a:ea typeface="+mn-lt"/>
+                <a:cs typeface="+mn-lt"/>
+              </a:rPr>
+              <a:t>PRINT</a:t>
+            </a:r>
+            <a:r>
+              <a:rPr lang="pt-BR" dirty="0">
+                <a:latin typeface="Consolas"/>
+                <a:ea typeface="+mn-lt"/>
+                <a:cs typeface="+mn-lt"/>
+              </a:rPr>
+              <a:t> </a:t>
+            </a:r>
+            <a:r>
+              <a:rPr lang="pt-BR" dirty="0">
+                <a:solidFill>
+                  <a:srgbClr val="FF0000"/>
+                </a:solidFill>
+                <a:latin typeface="Consolas"/>
+                <a:ea typeface="+mn-lt"/>
+                <a:cs typeface="+mn-lt"/>
+              </a:rPr>
+              <a:t>'Você deve desativar o trigger (safety) para os comandos DROP ou ALTER' </a:t>
+            </a:r>
+          </a:p>
+          <a:p>
+            <a:pPr marL="0" indent="0">
+              <a:buNone/>
+            </a:pPr>
+            <a:r>
+              <a:rPr lang="pt-BR" dirty="0">
+                <a:latin typeface="Consolas"/>
+                <a:ea typeface="+mn-lt"/>
+                <a:cs typeface="+mn-lt"/>
+              </a:rPr>
+              <a:t>           </a:t>
+            </a:r>
+            <a:r>
+              <a:rPr lang="pt-BR">
+                <a:solidFill>
+                  <a:schemeClr val="accent1"/>
+                </a:solidFill>
+                <a:latin typeface="Consolas"/>
+                <a:ea typeface="+mn-lt"/>
+                <a:cs typeface="+mn-lt"/>
+              </a:rPr>
+              <a:t>ROLLBACK; </a:t>
+            </a:r>
+          </a:p>
+          <a:p>
+            <a:pPr marL="0" indent="0">
+              <a:buNone/>
+            </a:pPr>
+            <a:r>
+              <a:rPr lang="pt-BR">
+                <a:solidFill>
+                  <a:schemeClr val="accent1"/>
+                </a:solidFill>
+                <a:latin typeface="Consolas"/>
+                <a:cs typeface="Calibri"/>
+              </a:rPr>
+              <a:t>      END</a:t>
+            </a:r>
+          </a:p>
+          <a:p>
+            <a:pPr marL="0" indent="0">
+              <a:buNone/>
+            </a:pPr>
+            <a:r>
+              <a:rPr lang="pt-BR">
+                <a:solidFill>
+                  <a:schemeClr val="accent1"/>
+                </a:solidFill>
+                <a:latin typeface="Consolas"/>
+                <a:cs typeface="Calibri"/>
+              </a:rPr>
+              <a:t>GO</a:t>
             </a:r>
             <a:endParaRPr lang="pt-BR" dirty="0">
+              <a:solidFill>
+                <a:schemeClr val="accent1"/>
+              </a:solidFill>
+              <a:latin typeface="Consolas"/>
               <a:cs typeface="Calibri"/>
             </a:endParaRPr>
           </a:p>

</xml_diff>